<commit_message>
Final version: VNS addes
</commit_message>
<xml_diff>
--- a/MFVS_prezentacija.pptx
+++ b/MFVS_prezentacija.pptx
@@ -599,7 +599,7 @@
             </a:ln>
             <a:extLst>
               <a:ext uri="{91240B29-F687-4f45-9708-019B960494DF}">
-                <a14:hiddenLine xmlns="" xmlns:a14="http://schemas.microsoft.com/office/drawing/2010/main" w="9525">
+                <a14:hiddenLine xmlns:a14="http://schemas.microsoft.com/office/drawing/2010/main" xmlns="" w="9525">
                   <a:solidFill>
                     <a:srgbClr val="000000"/>
                   </a:solidFill>
@@ -1701,7 +1701,7 @@
             </a:ln>
             <a:extLst>
               <a:ext uri="{91240B29-F687-4f45-9708-019B960494DF}">
-                <a14:hiddenLine xmlns="" xmlns:a14="http://schemas.microsoft.com/office/drawing/2010/main" w="9525">
+                <a14:hiddenLine xmlns:a14="http://schemas.microsoft.com/office/drawing/2010/main" xmlns="" w="9525">
                   <a:solidFill>
                     <a:srgbClr val="000000"/>
                   </a:solidFill>
@@ -2801,7 +2801,7 @@
             </a:ln>
             <a:extLst>
               <a:ext uri="{91240B29-F687-4f45-9708-019B960494DF}">
-                <a14:hiddenLine xmlns="" xmlns:a14="http://schemas.microsoft.com/office/drawing/2010/main" w="9525">
+                <a14:hiddenLine xmlns:a14="http://schemas.microsoft.com/office/drawing/2010/main" xmlns="" w="9525">
                   <a:solidFill>
                     <a:srgbClr val="000000"/>
                   </a:solidFill>
@@ -3779,7 +3779,7 @@
             </a:ln>
             <a:extLst>
               <a:ext uri="{91240B29-F687-4f45-9708-019B960494DF}">
-                <a14:hiddenLine xmlns="" xmlns:a14="http://schemas.microsoft.com/office/drawing/2010/main" w="9525">
+                <a14:hiddenLine xmlns:a14="http://schemas.microsoft.com/office/drawing/2010/main" xmlns="" w="9525">
                   <a:solidFill>
                     <a:srgbClr val="000000"/>
                   </a:solidFill>
@@ -4923,7 +4923,7 @@
             </a:ln>
             <a:extLst>
               <a:ext uri="{91240B29-F687-4f45-9708-019B960494DF}">
-                <a14:hiddenLine xmlns="" xmlns:a14="http://schemas.microsoft.com/office/drawing/2010/main" w="9525">
+                <a14:hiddenLine xmlns:a14="http://schemas.microsoft.com/office/drawing/2010/main" xmlns="" w="9525">
                   <a:solidFill>
                     <a:srgbClr val="000000"/>
                   </a:solidFill>
@@ -7630,7 +7630,7 @@
             </a:ln>
             <a:extLst>
               <a:ext uri="{91240B29-F687-4f45-9708-019B960494DF}">
-                <a14:hiddenLine xmlns="" xmlns:a14="http://schemas.microsoft.com/office/drawing/2010/main" w="9525">
+                <a14:hiddenLine xmlns:a14="http://schemas.microsoft.com/office/drawing/2010/main" xmlns="" w="9525">
                   <a:solidFill>
                     <a:srgbClr val="000000"/>
                   </a:solidFill>
@@ -8801,7 +8801,7 @@
             </a:ln>
             <a:extLst>
               <a:ext uri="{91240B29-F687-4f45-9708-019B960494DF}">
-                <a14:hiddenLine xmlns="" xmlns:a14="http://schemas.microsoft.com/office/drawing/2010/main" w="9525">
+                <a14:hiddenLine xmlns:a14="http://schemas.microsoft.com/office/drawing/2010/main" xmlns="" w="9525">
                   <a:solidFill>
                     <a:srgbClr val="000000"/>
                   </a:solidFill>
@@ -10729,7 +10729,7 @@
             </a:ln>
             <a:extLst>
               <a:ext uri="{91240B29-F687-4f45-9708-019B960494DF}">
-                <a14:hiddenLine xmlns="" xmlns:a14="http://schemas.microsoft.com/office/drawing/2010/main" w="9525">
+                <a14:hiddenLine xmlns:a14="http://schemas.microsoft.com/office/drawing/2010/main" xmlns="" w="9525">
                   <a:solidFill>
                     <a:srgbClr val="000000"/>
                   </a:solidFill>
@@ -11801,7 +11801,7 @@
             </a:ln>
             <a:extLst>
               <a:ext uri="{91240B29-F687-4f45-9708-019B960494DF}">
-                <a14:hiddenLine xmlns="" xmlns:a14="http://schemas.microsoft.com/office/drawing/2010/main" w="9525">
+                <a14:hiddenLine xmlns:a14="http://schemas.microsoft.com/office/drawing/2010/main" xmlns="" w="9525">
                   <a:solidFill>
                     <a:srgbClr val="000000"/>
                   </a:solidFill>
@@ -12865,7 +12865,7 @@
             </a:ln>
             <a:extLst>
               <a:ext uri="{91240B29-F687-4f45-9708-019B960494DF}">
-                <a14:hiddenLine xmlns="" xmlns:a14="http://schemas.microsoft.com/office/drawing/2010/main" w="9525">
+                <a14:hiddenLine xmlns:a14="http://schemas.microsoft.com/office/drawing/2010/main" xmlns="" w="9525">
                   <a:solidFill>
                     <a:srgbClr val="000000"/>
                   </a:solidFill>
@@ -13653,16 +13653,16 @@
           </a:p>
           <a:p>
             <a:r>
+              <a:rPr lang="en-US" dirty="0" err="1"/>
+              <a:t>M</a:t>
+            </a:r>
+            <a:r>
               <a:rPr dirty="0" err="1"/>
-              <a:t>Fakultet</a:t>
-            </a:r>
-            <a:r>
-              <a:rPr dirty="0"/>
-              <a:t> </a:t>
-            </a:r>
-            <a:r>
-              <a:rPr dirty="0" err="1"/>
-              <a:t>matematički</a:t>
+              <a:t>atematički</a:t>
+            </a:r>
+            <a:r>
+              <a:rPr lang="en-US" dirty="0"/>
+              <a:t> FAKULTET</a:t>
             </a:r>
             <a:r>
               <a:rPr dirty="0"/>
@@ -13806,7 +13806,7 @@
           <p:nvPr>
             <p:extLst>
               <p:ext uri="{D42A27DB-BD31-4B8C-83A1-F6EECF244321}">
-                <p14:modId xmlns:p14="http://schemas.microsoft.com/office/powerpoint/2010/main" val="2967997970"/>
+                <p14:modId xmlns:p14="http://schemas.microsoft.com/office/powerpoint/2010/main" val="1900331839"/>
               </p:ext>
             </p:extLst>
           </p:nvPr>
@@ -14190,8 +14190,12 @@
                     <a:lstStyle/>
                     <a:p>
                       <a:r>
+                        <a:rPr lang="en-US" dirty="0"/>
+                        <a:t>Mali</a:t>
+                      </a:r>
+                      <a:r>
                         <a:rPr dirty="0"/>
-                        <a:t>Tiny </a:t>
+                        <a:t> </a:t>
                       </a:r>
                       <a:r>
                         <a:rPr dirty="0" err="1"/>
@@ -15372,14 +15376,39 @@
           <a:bodyPr/>
           <a:lstStyle/>
           <a:p>
-            <a:endParaRPr/>
+            <a:endParaRPr dirty="0"/>
           </a:p>
           <a:p>
             <a:pPr algn="l">
               <a:defRPr sz="2000"/>
             </a:pPr>
             <a:r>
-              <a:t>G1 (15 čvorova, optimum 5) – egzaktni algoritmi.</a:t>
+              <a:rPr dirty="0"/>
+              <a:t>G1 (15 </a:t>
+            </a:r>
+            <a:r>
+              <a:rPr dirty="0" err="1"/>
+              <a:t>čvorova</a:t>
+            </a:r>
+            <a:r>
+              <a:rPr dirty="0"/>
+              <a:t>, optimum 5) – </a:t>
+            </a:r>
+            <a:r>
+              <a:rPr dirty="0" err="1"/>
+              <a:t>egzaktni</a:t>
+            </a:r>
+            <a:r>
+              <a:rPr dirty="0"/>
+              <a:t> </a:t>
+            </a:r>
+            <a:r>
+              <a:rPr dirty="0" err="1"/>
+              <a:t>algoritmi</a:t>
+            </a:r>
+            <a:r>
+              <a:rPr dirty="0"/>
+              <a:t>.</a:t>
             </a:r>
           </a:p>
           <a:p>
@@ -15387,7 +15416,16 @@
               <a:defRPr sz="2000"/>
             </a:pPr>
             <a:r>
-              <a:t>G2 (30 čvorova, optimum ≤ 10) – 2-aproksimacija.</a:t>
+              <a:rPr dirty="0"/>
+              <a:t>G2 (30 </a:t>
+            </a:r>
+            <a:r>
+              <a:rPr dirty="0" err="1"/>
+              <a:t>čvorova</a:t>
+            </a:r>
+            <a:r>
+              <a:rPr dirty="0"/>
+              <a:t>, optimum ≤ 10) – 2-aproksimacija.</a:t>
             </a:r>
           </a:p>
           <a:p>
@@ -15395,7 +15433,36 @@
               <a:defRPr sz="2000"/>
             </a:pPr>
             <a:r>
-              <a:t>G3 (100 čvorova, optimum 24) – ILP i iterativna kompresija.</a:t>
+              <a:rPr dirty="0"/>
+              <a:t>G3 (100 </a:t>
+            </a:r>
+            <a:r>
+              <a:rPr dirty="0" err="1"/>
+              <a:t>čvorova</a:t>
+            </a:r>
+            <a:r>
+              <a:rPr dirty="0"/>
+              <a:t>, optimum 24) – </a:t>
+            </a:r>
+            <a:r>
+              <a:rPr lang="en-US" dirty="0" err="1"/>
+              <a:t>I</a:t>
+            </a:r>
+            <a:r>
+              <a:rPr dirty="0" err="1"/>
+              <a:t>terativna</a:t>
+            </a:r>
+            <a:r>
+              <a:rPr dirty="0"/>
+              <a:t> </a:t>
+            </a:r>
+            <a:r>
+              <a:rPr dirty="0" err="1"/>
+              <a:t>kompresija</a:t>
+            </a:r>
+            <a:r>
+              <a:rPr dirty="0"/>
+              <a:t>.</a:t>
             </a:r>
           </a:p>
           <a:p>
@@ -15403,7 +15470,24 @@
               <a:defRPr sz="2000"/>
             </a:pPr>
             <a:r>
-              <a:t>G4 (200 čvorova, optimum 48) – primal-dual metode.</a:t>
+              <a:rPr dirty="0"/>
+              <a:t>G4 (200 </a:t>
+            </a:r>
+            <a:r>
+              <a:rPr dirty="0" err="1"/>
+              <a:t>čvorova</a:t>
+            </a:r>
+            <a:r>
+              <a:rPr dirty="0"/>
+              <a:t>, optimum 48) – primal-dual </a:t>
+            </a:r>
+            <a:r>
+              <a:rPr dirty="0" err="1"/>
+              <a:t>metode</a:t>
+            </a:r>
+            <a:r>
+              <a:rPr dirty="0"/>
+              <a:t>.</a:t>
             </a:r>
           </a:p>
         </p:txBody>

</xml_diff>